<commit_message>
added russian english cocktail menus
</commit_message>
<xml_diff>
--- a/qrCode.pptx
+++ b/qrCode.pptx
@@ -104,6 +104,11 @@
       </a:defRPr>
     </a:lvl9pPr>
   </p:defaultTextStyle>
+  <p:extLst>
+    <p:ext uri="{EFAFB233-063F-42B5-8137-9DF3F51BA10A}">
+      <p15:sldGuideLst xmlns:p15="http://schemas.microsoft.com/office/powerpoint/2012/main"/>
+    </p:ext>
+  </p:extLst>
 </p:presentation>
 </file>
 

</xml_diff>